<commit_message>
Added dialogue to presentation
</commit_message>
<xml_diff>
--- a/Status_Report_070621.pptx
+++ b/Status_Report_070621.pptx
@@ -110,6 +110,11 @@
       </a:defRPr>
     </a:lvl9pPr>
   </p:defaultTextStyle>
+  <p:extLst>
+    <p:ext uri="{EFAFB233-063F-42B5-8137-9DF3F51BA10A}">
+      <p15:sldGuideLst xmlns:p15="http://schemas.microsoft.com/office/powerpoint/2012/main"/>
+    </p:ext>
+  </p:extLst>
 </p:presentation>
 </file>
 
@@ -5584,7 +5589,7 @@
           <a:p>
             <a:fld id="{49CE4A12-119B-4DD4-B02C-AC5DC3450103}" type="datetimeFigureOut">
               <a:rPr lang="en-CH" smtClean="0"/>
-              <a:t>06/06/2021</a:t>
+              <a:t>07/06/2021</a:t>
             </a:fld>
             <a:endParaRPr lang="en-CH"/>
           </a:p>
@@ -5784,7 +5789,7 @@
           <a:p>
             <a:fld id="{49CE4A12-119B-4DD4-B02C-AC5DC3450103}" type="datetimeFigureOut">
               <a:rPr lang="en-CH" smtClean="0"/>
-              <a:t>06/06/2021</a:t>
+              <a:t>07/06/2021</a:t>
             </a:fld>
             <a:endParaRPr lang="en-CH"/>
           </a:p>
@@ -5994,7 +5999,7 @@
           <a:p>
             <a:fld id="{49CE4A12-119B-4DD4-B02C-AC5DC3450103}" type="datetimeFigureOut">
               <a:rPr lang="en-CH" smtClean="0"/>
-              <a:t>06/06/2021</a:t>
+              <a:t>07/06/2021</a:t>
             </a:fld>
             <a:endParaRPr lang="en-CH"/>
           </a:p>
@@ -6194,7 +6199,7 @@
           <a:p>
             <a:fld id="{49CE4A12-119B-4DD4-B02C-AC5DC3450103}" type="datetimeFigureOut">
               <a:rPr lang="en-CH" smtClean="0"/>
-              <a:t>06/06/2021</a:t>
+              <a:t>07/06/2021</a:t>
             </a:fld>
             <a:endParaRPr lang="en-CH"/>
           </a:p>
@@ -6470,7 +6475,7 @@
           <a:p>
             <a:fld id="{49CE4A12-119B-4DD4-B02C-AC5DC3450103}" type="datetimeFigureOut">
               <a:rPr lang="en-CH" smtClean="0"/>
-              <a:t>06/06/2021</a:t>
+              <a:t>07/06/2021</a:t>
             </a:fld>
             <a:endParaRPr lang="en-CH"/>
           </a:p>
@@ -6738,7 +6743,7 @@
           <a:p>
             <a:fld id="{49CE4A12-119B-4DD4-B02C-AC5DC3450103}" type="datetimeFigureOut">
               <a:rPr lang="en-CH" smtClean="0"/>
-              <a:t>06/06/2021</a:t>
+              <a:t>07/06/2021</a:t>
             </a:fld>
             <a:endParaRPr lang="en-CH"/>
           </a:p>
@@ -7153,7 +7158,7 @@
           <a:p>
             <a:fld id="{49CE4A12-119B-4DD4-B02C-AC5DC3450103}" type="datetimeFigureOut">
               <a:rPr lang="en-CH" smtClean="0"/>
-              <a:t>06/06/2021</a:t>
+              <a:t>07/06/2021</a:t>
             </a:fld>
             <a:endParaRPr lang="en-CH"/>
           </a:p>
@@ -7295,7 +7300,7 @@
           <a:p>
             <a:fld id="{49CE4A12-119B-4DD4-B02C-AC5DC3450103}" type="datetimeFigureOut">
               <a:rPr lang="en-CH" smtClean="0"/>
-              <a:t>06/06/2021</a:t>
+              <a:t>07/06/2021</a:t>
             </a:fld>
             <a:endParaRPr lang="en-CH"/>
           </a:p>
@@ -7408,7 +7413,7 @@
           <a:p>
             <a:fld id="{49CE4A12-119B-4DD4-B02C-AC5DC3450103}" type="datetimeFigureOut">
               <a:rPr lang="en-CH" smtClean="0"/>
-              <a:t>06/06/2021</a:t>
+              <a:t>07/06/2021</a:t>
             </a:fld>
             <a:endParaRPr lang="en-CH"/>
           </a:p>
@@ -7721,7 +7726,7 @@
           <a:p>
             <a:fld id="{49CE4A12-119B-4DD4-B02C-AC5DC3450103}" type="datetimeFigureOut">
               <a:rPr lang="en-CH" smtClean="0"/>
-              <a:t>06/06/2021</a:t>
+              <a:t>07/06/2021</a:t>
             </a:fld>
             <a:endParaRPr lang="en-CH"/>
           </a:p>
@@ -8010,7 +8015,7 @@
           <a:p>
             <a:fld id="{49CE4A12-119B-4DD4-B02C-AC5DC3450103}" type="datetimeFigureOut">
               <a:rPr lang="en-CH" smtClean="0"/>
-              <a:t>06/06/2021</a:t>
+              <a:t>07/06/2021</a:t>
             </a:fld>
             <a:endParaRPr lang="en-CH"/>
           </a:p>
@@ -8253,7 +8258,7 @@
           <a:p>
             <a:fld id="{49CE4A12-119B-4DD4-B02C-AC5DC3450103}" type="datetimeFigureOut">
               <a:rPr lang="en-CH" smtClean="0"/>
-              <a:t>06/06/2021</a:t>
+              <a:t>07/06/2021</a:t>
             </a:fld>
             <a:endParaRPr lang="en-CH"/>
           </a:p>
@@ -12879,39 +12884,18 @@
           <a:lstStyle/>
           <a:p>
             <a:r>
-              <a:rPr lang="de-CH" dirty="0" err="1"/>
-              <a:t>Participant</a:t>
-            </a:r>
-            <a:r>
-              <a:rPr lang="de-CH" dirty="0"/>
-              <a:t> B </a:t>
-            </a:r>
-            <a:r>
-              <a:rPr lang="de-CH" dirty="0" err="1"/>
-              <a:t>Dialogue</a:t>
-            </a:r>
-            <a:r>
-              <a:rPr lang="de-CH" dirty="0"/>
-              <a:t> </a:t>
-            </a:r>
-            <a:r>
-              <a:rPr lang="de-CH" dirty="0" err="1"/>
-              <a:t>Example</a:t>
-            </a:r>
-            <a:r>
-              <a:rPr lang="de-CH" dirty="0"/>
-              <a:t>:</a:t>
-            </a:r>
-            <a:endParaRPr lang="en-CH" dirty="0"/>
+              <a:rPr lang="en-NZ" dirty="0"/>
+              <a:t>Participant B Dialogue Example:</a:t>
+            </a:r>
           </a:p>
         </p:txBody>
       </p:sp>
       <p:sp>
         <p:nvSpPr>
-          <p:cNvPr id="3" name="Content Placeholder 2">
+          <p:cNvPr id="4" name="Text Placeholder 3">
             <a:extLst>
               <a:ext uri="{FF2B5EF4-FFF2-40B4-BE49-F238E27FC236}">
-                <a16:creationId xmlns:a16="http://schemas.microsoft.com/office/drawing/2014/main" id="{B302821B-34B4-420E-BB61-F5E66E85871B}"/>
+                <a16:creationId xmlns:a16="http://schemas.microsoft.com/office/drawing/2014/main" id="{F396E796-EC0F-4A7A-8AD7-B2F40642CABB}"/>
               </a:ext>
             </a:extLst>
           </p:cNvPr>
@@ -12919,7 +12903,7 @@
             <a:spLocks noGrp="1"/>
           </p:cNvSpPr>
           <p:nvPr>
-            <p:ph idx="1"/>
+            <p:ph type="body" idx="1"/>
           </p:nvPr>
         </p:nvSpPr>
         <p:spPr/>
@@ -12927,7 +12911,563 @@
           <a:bodyPr/>
           <a:lstStyle/>
           <a:p>
-            <a:endParaRPr lang="en-CH" dirty="0"/>
+            <a:r>
+              <a:rPr lang="en-NZ"/>
+              <a:t>Participant B</a:t>
+            </a:r>
+          </a:p>
+        </p:txBody>
+      </p:sp>
+      <p:sp>
+        <p:nvSpPr>
+          <p:cNvPr id="5" name="Content Placeholder 4">
+            <a:extLst>
+              <a:ext uri="{FF2B5EF4-FFF2-40B4-BE49-F238E27FC236}">
+                <a16:creationId xmlns:a16="http://schemas.microsoft.com/office/drawing/2014/main" id="{41717339-F85C-4DBE-A4CD-5F174BDA8E57}"/>
+              </a:ext>
+            </a:extLst>
+          </p:cNvPr>
+          <p:cNvSpPr>
+            <a:spLocks noGrp="1"/>
+          </p:cNvSpPr>
+          <p:nvPr>
+            <p:ph sz="half" idx="2"/>
+          </p:nvPr>
+        </p:nvSpPr>
+        <p:spPr>
+          <a:xfrm>
+            <a:off x="839788" y="2505075"/>
+            <a:ext cx="4768019" cy="3684588"/>
+          </a:xfrm>
+        </p:spPr>
+        <p:txBody>
+          <a:bodyPr/>
+          <a:lstStyle/>
+          <a:p>
+            <a:pPr marL="0" indent="0">
+              <a:buNone/>
+            </a:pPr>
+            <a:endParaRPr lang="en-NZ" dirty="0"/>
+          </a:p>
+          <a:p>
+            <a:pPr marL="0" indent="0">
+              <a:buNone/>
+            </a:pPr>
+            <a:r>
+              <a:rPr lang="en-NZ" dirty="0"/>
+              <a:t>“</a:t>
+            </a:r>
+            <a:r>
+              <a:rPr lang="en-NZ" dirty="0" err="1"/>
+              <a:t>lon</a:t>
+            </a:r>
+            <a:r>
+              <a:rPr lang="en-NZ" dirty="0"/>
+              <a:t>”</a:t>
+            </a:r>
+          </a:p>
+          <a:p>
+            <a:pPr marL="0" indent="0">
+              <a:buNone/>
+            </a:pPr>
+            <a:endParaRPr lang="en-NZ" dirty="0"/>
+          </a:p>
+          <a:p>
+            <a:pPr marL="0" indent="0">
+              <a:buNone/>
+            </a:pPr>
+            <a:r>
+              <a:rPr lang="en-NZ" dirty="0"/>
+              <a:t>“mi </a:t>
+            </a:r>
+            <a:r>
+              <a:rPr lang="en-NZ" dirty="0" err="1"/>
+              <a:t>sona</a:t>
+            </a:r>
+            <a:r>
+              <a:rPr lang="en-NZ" dirty="0"/>
+              <a:t>”</a:t>
+            </a:r>
+          </a:p>
+          <a:p>
+            <a:pPr marL="0" indent="0">
+              <a:buNone/>
+            </a:pPr>
+            <a:endParaRPr lang="en-NZ" dirty="0"/>
+          </a:p>
+          <a:p>
+            <a:pPr marL="0" indent="0">
+              <a:buNone/>
+            </a:pPr>
+            <a:r>
+              <a:rPr lang="en-NZ" dirty="0"/>
+              <a:t>“kasi li </a:t>
+            </a:r>
+            <a:r>
+              <a:rPr lang="en-NZ" dirty="0" err="1"/>
+              <a:t>laso</a:t>
+            </a:r>
+            <a:r>
+              <a:rPr lang="en-NZ" dirty="0"/>
+              <a:t>?”</a:t>
+            </a:r>
+          </a:p>
+        </p:txBody>
+      </p:sp>
+      <p:sp>
+        <p:nvSpPr>
+          <p:cNvPr id="6" name="Text Placeholder 5">
+            <a:extLst>
+              <a:ext uri="{FF2B5EF4-FFF2-40B4-BE49-F238E27FC236}">
+                <a16:creationId xmlns:a16="http://schemas.microsoft.com/office/drawing/2014/main" id="{AD56EB83-6453-40A1-9CAC-19CA07C70E08}"/>
+              </a:ext>
+            </a:extLst>
+          </p:cNvPr>
+          <p:cNvSpPr>
+            <a:spLocks noGrp="1"/>
+          </p:cNvSpPr>
+          <p:nvPr>
+            <p:ph type="body" sz="quarter" idx="3"/>
+          </p:nvPr>
+        </p:nvSpPr>
+        <p:spPr/>
+        <p:txBody>
+          <a:bodyPr/>
+          <a:lstStyle/>
+          <a:p>
+            <a:r>
+              <a:rPr lang="en-NZ"/>
+              <a:t>Experimenter</a:t>
+            </a:r>
+          </a:p>
+        </p:txBody>
+      </p:sp>
+      <p:sp>
+        <p:nvSpPr>
+          <p:cNvPr id="7" name="Content Placeholder 6">
+            <a:extLst>
+              <a:ext uri="{FF2B5EF4-FFF2-40B4-BE49-F238E27FC236}">
+                <a16:creationId xmlns:a16="http://schemas.microsoft.com/office/drawing/2014/main" id="{5FCD66C2-083C-4683-9874-037DC7807C93}"/>
+              </a:ext>
+            </a:extLst>
+          </p:cNvPr>
+          <p:cNvSpPr>
+            <a:spLocks noGrp="1"/>
+          </p:cNvSpPr>
+          <p:nvPr>
+            <p:ph sz="quarter" idx="4"/>
+          </p:nvPr>
+        </p:nvSpPr>
+        <p:spPr>
+          <a:xfrm>
+            <a:off x="5997575" y="2505075"/>
+            <a:ext cx="5747581" cy="3684588"/>
+          </a:xfrm>
+        </p:spPr>
+        <p:txBody>
+          <a:bodyPr/>
+          <a:lstStyle/>
+          <a:p>
+            <a:pPr marL="0" indent="0">
+              <a:buNone/>
+            </a:pPr>
+            <a:r>
+              <a:rPr lang="en-NZ" dirty="0"/>
+              <a:t>“</a:t>
+            </a:r>
+            <a:r>
+              <a:rPr lang="en-NZ" dirty="0" err="1"/>
+              <a:t>sina</a:t>
+            </a:r>
+            <a:r>
+              <a:rPr lang="en-NZ" dirty="0"/>
+              <a:t> wile ala wile </a:t>
+            </a:r>
+            <a:r>
+              <a:rPr lang="en-NZ" dirty="0" err="1"/>
+              <a:t>sona</a:t>
+            </a:r>
+            <a:r>
+              <a:rPr lang="en-NZ" dirty="0"/>
+              <a:t> e </a:t>
+            </a:r>
+            <a:r>
+              <a:rPr lang="en-NZ" dirty="0" err="1"/>
+              <a:t>nimi</a:t>
+            </a:r>
+            <a:r>
+              <a:rPr lang="en-NZ" dirty="0"/>
+              <a:t> ‘</a:t>
+            </a:r>
+            <a:r>
+              <a:rPr lang="en-NZ" dirty="0" err="1"/>
+              <a:t>Kule</a:t>
+            </a:r>
+            <a:r>
+              <a:rPr lang="en-NZ" dirty="0"/>
+              <a:t>’?”</a:t>
+            </a:r>
+          </a:p>
+          <a:p>
+            <a:pPr marL="0" indent="0">
+              <a:buNone/>
+            </a:pPr>
+            <a:endParaRPr lang="en-NZ" dirty="0"/>
+          </a:p>
+          <a:p>
+            <a:pPr marL="0" indent="0">
+              <a:buNone/>
+            </a:pPr>
+            <a:endParaRPr lang="en-NZ" dirty="0"/>
+          </a:p>
+          <a:p>
+            <a:pPr marL="0" indent="0">
+              <a:buNone/>
+            </a:pPr>
+            <a:endParaRPr lang="en-NZ" dirty="0"/>
+          </a:p>
+          <a:p>
+            <a:pPr marL="0" indent="0">
+              <a:buNone/>
+            </a:pPr>
+            <a:r>
+              <a:rPr lang="en-NZ" dirty="0"/>
+              <a:t>“kasi li jo e </a:t>
+            </a:r>
+            <a:r>
+              <a:rPr lang="en-NZ" dirty="0" err="1"/>
+              <a:t>kule</a:t>
+            </a:r>
+            <a:r>
+              <a:rPr lang="en-NZ" dirty="0"/>
+              <a:t> seme?”</a:t>
+            </a:r>
+          </a:p>
+          <a:p>
+            <a:pPr marL="0" indent="0">
+              <a:buNone/>
+            </a:pPr>
+            <a:endParaRPr lang="en-NZ" dirty="0"/>
+          </a:p>
+          <a:p>
+            <a:pPr marL="0" indent="0">
+              <a:buNone/>
+            </a:pPr>
+            <a:r>
+              <a:rPr lang="en-NZ" dirty="0"/>
+              <a:t>“</a:t>
+            </a:r>
+            <a:r>
+              <a:rPr lang="en-NZ" dirty="0" err="1"/>
+              <a:t>lon</a:t>
+            </a:r>
+            <a:r>
+              <a:rPr lang="en-NZ" dirty="0"/>
+              <a:t>!”</a:t>
+            </a:r>
+          </a:p>
+        </p:txBody>
+      </p:sp>
+      <p:pic>
+        <p:nvPicPr>
+          <p:cNvPr id="9" name="Picture 8">
+            <a:extLst>
+              <a:ext uri="{FF2B5EF4-FFF2-40B4-BE49-F238E27FC236}">
+                <a16:creationId xmlns:a16="http://schemas.microsoft.com/office/drawing/2014/main" id="{13EAF371-4451-4A1B-8BF3-D1083F05ED30}"/>
+              </a:ext>
+            </a:extLst>
+          </p:cNvPr>
+          <p:cNvPicPr>
+            <a:picLocks noChangeAspect="1"/>
+          </p:cNvPicPr>
+          <p:nvPr/>
+        </p:nvPicPr>
+        <p:blipFill>
+          <a:blip r:embed="rId2"/>
+          <a:stretch>
+            <a:fillRect/>
+          </a:stretch>
+        </p:blipFill>
+        <p:spPr>
+          <a:xfrm>
+            <a:off x="6172200" y="3429000"/>
+            <a:ext cx="1438476" cy="771633"/>
+          </a:xfrm>
+          <a:prstGeom prst="rect">
+            <a:avLst/>
+          </a:prstGeom>
+        </p:spPr>
+      </p:pic>
+      <p:sp>
+        <p:nvSpPr>
+          <p:cNvPr id="10" name="TextBox 9">
+            <a:extLst>
+              <a:ext uri="{FF2B5EF4-FFF2-40B4-BE49-F238E27FC236}">
+                <a16:creationId xmlns:a16="http://schemas.microsoft.com/office/drawing/2014/main" id="{8EA843FC-8BB1-4477-BD9E-B5D35B2FE885}"/>
+              </a:ext>
+            </a:extLst>
+          </p:cNvPr>
+          <p:cNvSpPr txBox="1"/>
+          <p:nvPr/>
+        </p:nvSpPr>
+        <p:spPr>
+          <a:xfrm>
+            <a:off x="5638413" y="2514600"/>
+            <a:ext cx="6465903" cy="523220"/>
+          </a:xfrm>
+          <a:prstGeom prst="rect">
+            <a:avLst/>
+          </a:prstGeom>
+          <a:solidFill>
+            <a:schemeClr val="bg1"/>
+          </a:solidFill>
+        </p:spPr>
+        <p:txBody>
+          <a:bodyPr wrap="square" rtlCol="0">
+            <a:spAutoFit/>
+          </a:bodyPr>
+          <a:lstStyle/>
+          <a:p>
+            <a:r>
+              <a:rPr lang="en-NZ" sz="2800" dirty="0"/>
+              <a:t>“Would you like to learn the word ‘</a:t>
+            </a:r>
+            <a:r>
+              <a:rPr lang="en-NZ" sz="2800" dirty="0" err="1"/>
+              <a:t>kule</a:t>
+            </a:r>
+            <a:r>
+              <a:rPr lang="en-NZ" sz="2800" dirty="0"/>
+              <a:t>’ ?”</a:t>
+            </a:r>
+          </a:p>
+        </p:txBody>
+      </p:sp>
+      <p:sp>
+        <p:nvSpPr>
+          <p:cNvPr id="12" name="TextBox 11">
+            <a:extLst>
+              <a:ext uri="{FF2B5EF4-FFF2-40B4-BE49-F238E27FC236}">
+                <a16:creationId xmlns:a16="http://schemas.microsoft.com/office/drawing/2014/main" id="{7BDF0234-A3FF-44AE-ABB7-79D50318A820}"/>
+              </a:ext>
+            </a:extLst>
+          </p:cNvPr>
+          <p:cNvSpPr txBox="1"/>
+          <p:nvPr/>
+        </p:nvSpPr>
+        <p:spPr>
+          <a:xfrm>
+            <a:off x="786156" y="3037820"/>
+            <a:ext cx="1150309" cy="523220"/>
+          </a:xfrm>
+          <a:prstGeom prst="rect">
+            <a:avLst/>
+          </a:prstGeom>
+          <a:solidFill>
+            <a:schemeClr val="bg1"/>
+          </a:solidFill>
+        </p:spPr>
+        <p:txBody>
+          <a:bodyPr wrap="square" rtlCol="0">
+            <a:spAutoFit/>
+          </a:bodyPr>
+          <a:lstStyle/>
+          <a:p>
+            <a:r>
+              <a:rPr lang="en-NZ" sz="2800" dirty="0"/>
+              <a:t>“Yes.”</a:t>
+            </a:r>
+          </a:p>
+        </p:txBody>
+      </p:sp>
+      <p:sp>
+        <p:nvSpPr>
+          <p:cNvPr id="13" name="TextBox 12">
+            <a:extLst>
+              <a:ext uri="{FF2B5EF4-FFF2-40B4-BE49-F238E27FC236}">
+                <a16:creationId xmlns:a16="http://schemas.microsoft.com/office/drawing/2014/main" id="{C37E68AE-6814-422A-AA4E-0C5BE091F72B}"/>
+              </a:ext>
+            </a:extLst>
+          </p:cNvPr>
+          <p:cNvSpPr txBox="1"/>
+          <p:nvPr/>
+        </p:nvSpPr>
+        <p:spPr>
+          <a:xfrm>
+            <a:off x="5607807" y="3083950"/>
+            <a:ext cx="6083717" cy="1384995"/>
+          </a:xfrm>
+          <a:prstGeom prst="rect">
+            <a:avLst/>
+          </a:prstGeom>
+          <a:solidFill>
+            <a:schemeClr val="bg1"/>
+          </a:solidFill>
+        </p:spPr>
+        <p:txBody>
+          <a:bodyPr wrap="square" rtlCol="0">
+            <a:spAutoFit/>
+          </a:bodyPr>
+          <a:lstStyle/>
+          <a:p>
+            <a:endParaRPr lang="en-NZ" sz="2800" dirty="0"/>
+          </a:p>
+          <a:p>
+            <a:r>
+              <a:rPr lang="en-NZ" sz="2800" dirty="0"/>
+              <a:t>“This is Red/Green/Blue/Yellow”</a:t>
+            </a:r>
+          </a:p>
+          <a:p>
+            <a:endParaRPr lang="en-NZ" sz="2800" dirty="0"/>
+          </a:p>
+        </p:txBody>
+      </p:sp>
+      <p:sp>
+        <p:nvSpPr>
+          <p:cNvPr id="14" name="TextBox 13">
+            <a:extLst>
+              <a:ext uri="{FF2B5EF4-FFF2-40B4-BE49-F238E27FC236}">
+                <a16:creationId xmlns:a16="http://schemas.microsoft.com/office/drawing/2014/main" id="{6438BA55-EB19-4D9B-9729-A67630AA5F48}"/>
+              </a:ext>
+            </a:extLst>
+          </p:cNvPr>
+          <p:cNvSpPr txBox="1"/>
+          <p:nvPr/>
+        </p:nvSpPr>
+        <p:spPr>
+          <a:xfrm>
+            <a:off x="786156" y="3973826"/>
+            <a:ext cx="3042102" cy="523220"/>
+          </a:xfrm>
+          <a:prstGeom prst="rect">
+            <a:avLst/>
+          </a:prstGeom>
+          <a:solidFill>
+            <a:schemeClr val="bg1"/>
+          </a:solidFill>
+        </p:spPr>
+        <p:txBody>
+          <a:bodyPr wrap="square" rtlCol="0">
+            <a:spAutoFit/>
+          </a:bodyPr>
+          <a:lstStyle/>
+          <a:p>
+            <a:r>
+              <a:rPr lang="en-NZ" sz="2800" dirty="0"/>
+              <a:t>“I understand.”</a:t>
+            </a:r>
+          </a:p>
+        </p:txBody>
+      </p:sp>
+      <p:sp>
+        <p:nvSpPr>
+          <p:cNvPr id="15" name="TextBox 14">
+            <a:extLst>
+              <a:ext uri="{FF2B5EF4-FFF2-40B4-BE49-F238E27FC236}">
+                <a16:creationId xmlns:a16="http://schemas.microsoft.com/office/drawing/2014/main" id="{56C8974D-06B8-4DE3-B3E8-4F364E8EA925}"/>
+              </a:ext>
+            </a:extLst>
+          </p:cNvPr>
+          <p:cNvSpPr txBox="1"/>
+          <p:nvPr/>
+        </p:nvSpPr>
+        <p:spPr>
+          <a:xfrm>
+            <a:off x="5607562" y="4552385"/>
+            <a:ext cx="5214317" cy="523220"/>
+          </a:xfrm>
+          <a:prstGeom prst="rect">
+            <a:avLst/>
+          </a:prstGeom>
+          <a:solidFill>
+            <a:schemeClr val="bg1"/>
+          </a:solidFill>
+        </p:spPr>
+        <p:txBody>
+          <a:bodyPr wrap="square" rtlCol="0">
+            <a:spAutoFit/>
+          </a:bodyPr>
+          <a:lstStyle/>
+          <a:p>
+            <a:r>
+              <a:rPr lang="en-NZ" sz="2800" dirty="0"/>
+              <a:t>“What colour are plants?”</a:t>
+            </a:r>
+          </a:p>
+        </p:txBody>
+      </p:sp>
+      <p:sp>
+        <p:nvSpPr>
+          <p:cNvPr id="16" name="TextBox 15">
+            <a:extLst>
+              <a:ext uri="{FF2B5EF4-FFF2-40B4-BE49-F238E27FC236}">
+                <a16:creationId xmlns:a16="http://schemas.microsoft.com/office/drawing/2014/main" id="{8939A482-D0C5-4C79-850C-5C7D3C78F8E5}"/>
+              </a:ext>
+            </a:extLst>
+          </p:cNvPr>
+          <p:cNvSpPr txBox="1"/>
+          <p:nvPr/>
+        </p:nvSpPr>
+        <p:spPr>
+          <a:xfrm>
+            <a:off x="786156" y="5029791"/>
+            <a:ext cx="3042102" cy="523220"/>
+          </a:xfrm>
+          <a:prstGeom prst="rect">
+            <a:avLst/>
+          </a:prstGeom>
+          <a:solidFill>
+            <a:schemeClr val="bg1"/>
+          </a:solidFill>
+        </p:spPr>
+        <p:txBody>
+          <a:bodyPr wrap="square" rtlCol="0">
+            <a:spAutoFit/>
+          </a:bodyPr>
+          <a:lstStyle/>
+          <a:p>
+            <a:r>
+              <a:rPr lang="en-NZ" sz="2800" dirty="0"/>
+              <a:t>“Plants are green?”</a:t>
+            </a:r>
+          </a:p>
+        </p:txBody>
+      </p:sp>
+      <p:sp>
+        <p:nvSpPr>
+          <p:cNvPr id="17" name="TextBox 16">
+            <a:extLst>
+              <a:ext uri="{FF2B5EF4-FFF2-40B4-BE49-F238E27FC236}">
+                <a16:creationId xmlns:a16="http://schemas.microsoft.com/office/drawing/2014/main" id="{ABC0D7E7-EDFF-462B-80C2-6CD9F3AD03CD}"/>
+              </a:ext>
+            </a:extLst>
+          </p:cNvPr>
+          <p:cNvSpPr txBox="1"/>
+          <p:nvPr/>
+        </p:nvSpPr>
+        <p:spPr>
+          <a:xfrm>
+            <a:off x="5607562" y="5553011"/>
+            <a:ext cx="3042102" cy="523220"/>
+          </a:xfrm>
+          <a:prstGeom prst="rect">
+            <a:avLst/>
+          </a:prstGeom>
+          <a:solidFill>
+            <a:schemeClr val="bg1"/>
+          </a:solidFill>
+        </p:spPr>
+        <p:txBody>
+          <a:bodyPr wrap="square" rtlCol="0">
+            <a:spAutoFit/>
+          </a:bodyPr>
+          <a:lstStyle/>
+          <a:p>
+            <a:r>
+              <a:rPr lang="en-NZ" sz="2800" dirty="0"/>
+              <a:t>“Correct!”</a:t>
+            </a:r>
           </a:p>
         </p:txBody>
       </p:sp>
@@ -12941,6 +13481,360 @@
   <p:clrMapOvr>
     <a:masterClrMapping/>
   </p:clrMapOvr>
+  <p:timing>
+    <p:tnLst>
+      <p:par>
+        <p:cTn id="1" dur="indefinite" restart="never" nodeType="tmRoot">
+          <p:childTnLst>
+            <p:seq concurrent="1" nextAc="seek">
+              <p:cTn id="2" dur="indefinite" nodeType="mainSeq">
+                <p:childTnLst>
+                  <p:par>
+                    <p:cTn id="3" fill="hold">
+                      <p:stCondLst>
+                        <p:cond delay="indefinite"/>
+                      </p:stCondLst>
+                      <p:childTnLst>
+                        <p:par>
+                          <p:cTn id="4" fill="hold">
+                            <p:stCondLst>
+                              <p:cond delay="0"/>
+                            </p:stCondLst>
+                            <p:childTnLst>
+                              <p:par>
+                                <p:cTn id="5" presetID="1" presetClass="entr" presetSubtype="0" fill="hold" grpId="0" nodeType="clickEffect">
+                                  <p:stCondLst>
+                                    <p:cond delay="0"/>
+                                  </p:stCondLst>
+                                  <p:childTnLst>
+                                    <p:set>
+                                      <p:cBhvr>
+                                        <p:cTn id="6" dur="1" fill="hold">
+                                          <p:stCondLst>
+                                            <p:cond delay="0"/>
+                                          </p:stCondLst>
+                                        </p:cTn>
+                                        <p:tgtEl>
+                                          <p:spTgt spid="10"/>
+                                        </p:tgtEl>
+                                        <p:attrNameLst>
+                                          <p:attrName>style.visibility</p:attrName>
+                                        </p:attrNameLst>
+                                      </p:cBhvr>
+                                      <p:to>
+                                        <p:strVal val="visible"/>
+                                      </p:to>
+                                    </p:set>
+                                  </p:childTnLst>
+                                </p:cTn>
+                              </p:par>
+                            </p:childTnLst>
+                          </p:cTn>
+                        </p:par>
+                      </p:childTnLst>
+                    </p:cTn>
+                  </p:par>
+                  <p:par>
+                    <p:cTn id="7" fill="hold">
+                      <p:stCondLst>
+                        <p:cond delay="indefinite"/>
+                      </p:stCondLst>
+                      <p:childTnLst>
+                        <p:par>
+                          <p:cTn id="8" fill="hold">
+                            <p:stCondLst>
+                              <p:cond delay="0"/>
+                            </p:stCondLst>
+                            <p:childTnLst>
+                              <p:par>
+                                <p:cTn id="9" presetID="1" presetClass="entr" presetSubtype="0" fill="hold" grpId="0" nodeType="clickEffect">
+                                  <p:stCondLst>
+                                    <p:cond delay="0"/>
+                                  </p:stCondLst>
+                                  <p:childTnLst>
+                                    <p:set>
+                                      <p:cBhvr>
+                                        <p:cTn id="10" dur="1" fill="hold">
+                                          <p:stCondLst>
+                                            <p:cond delay="0"/>
+                                          </p:stCondLst>
+                                        </p:cTn>
+                                        <p:tgtEl>
+                                          <p:spTgt spid="12"/>
+                                        </p:tgtEl>
+                                        <p:attrNameLst>
+                                          <p:attrName>style.visibility</p:attrName>
+                                        </p:attrNameLst>
+                                      </p:cBhvr>
+                                      <p:to>
+                                        <p:strVal val="visible"/>
+                                      </p:to>
+                                    </p:set>
+                                  </p:childTnLst>
+                                </p:cTn>
+                              </p:par>
+                            </p:childTnLst>
+                          </p:cTn>
+                        </p:par>
+                      </p:childTnLst>
+                    </p:cTn>
+                  </p:par>
+                  <p:par>
+                    <p:cTn id="11" fill="hold">
+                      <p:stCondLst>
+                        <p:cond delay="indefinite"/>
+                      </p:stCondLst>
+                      <p:childTnLst>
+                        <p:par>
+                          <p:cTn id="12" fill="hold">
+                            <p:stCondLst>
+                              <p:cond delay="0"/>
+                            </p:stCondLst>
+                            <p:childTnLst>
+                              <p:par>
+                                <p:cTn id="13" presetID="1" presetClass="entr" presetSubtype="0" fill="hold" grpId="0" nodeType="clickEffect">
+                                  <p:stCondLst>
+                                    <p:cond delay="0"/>
+                                  </p:stCondLst>
+                                  <p:childTnLst>
+                                    <p:set>
+                                      <p:cBhvr>
+                                        <p:cTn id="14" dur="1" fill="hold">
+                                          <p:stCondLst>
+                                            <p:cond delay="0"/>
+                                          </p:stCondLst>
+                                        </p:cTn>
+                                        <p:tgtEl>
+                                          <p:spTgt spid="13"/>
+                                        </p:tgtEl>
+                                        <p:attrNameLst>
+                                          <p:attrName>style.visibility</p:attrName>
+                                        </p:attrNameLst>
+                                      </p:cBhvr>
+                                      <p:to>
+                                        <p:strVal val="visible"/>
+                                      </p:to>
+                                    </p:set>
+                                  </p:childTnLst>
+                                </p:cTn>
+                              </p:par>
+                            </p:childTnLst>
+                          </p:cTn>
+                        </p:par>
+                      </p:childTnLst>
+                    </p:cTn>
+                  </p:par>
+                  <p:par>
+                    <p:cTn id="15" fill="hold">
+                      <p:stCondLst>
+                        <p:cond delay="indefinite"/>
+                      </p:stCondLst>
+                      <p:childTnLst>
+                        <p:par>
+                          <p:cTn id="16" fill="hold">
+                            <p:stCondLst>
+                              <p:cond delay="0"/>
+                            </p:stCondLst>
+                            <p:childTnLst>
+                              <p:par>
+                                <p:cTn id="17" presetID="1" presetClass="entr" presetSubtype="0" fill="hold" grpId="0" nodeType="clickEffect">
+                                  <p:stCondLst>
+                                    <p:cond delay="0"/>
+                                  </p:stCondLst>
+                                  <p:childTnLst>
+                                    <p:set>
+                                      <p:cBhvr>
+                                        <p:cTn id="18" dur="1" fill="hold">
+                                          <p:stCondLst>
+                                            <p:cond delay="0"/>
+                                          </p:stCondLst>
+                                        </p:cTn>
+                                        <p:tgtEl>
+                                          <p:spTgt spid="14"/>
+                                        </p:tgtEl>
+                                        <p:attrNameLst>
+                                          <p:attrName>style.visibility</p:attrName>
+                                        </p:attrNameLst>
+                                      </p:cBhvr>
+                                      <p:to>
+                                        <p:strVal val="visible"/>
+                                      </p:to>
+                                    </p:set>
+                                  </p:childTnLst>
+                                </p:cTn>
+                              </p:par>
+                            </p:childTnLst>
+                          </p:cTn>
+                        </p:par>
+                      </p:childTnLst>
+                    </p:cTn>
+                  </p:par>
+                  <p:par>
+                    <p:cTn id="19" fill="hold">
+                      <p:stCondLst>
+                        <p:cond delay="indefinite"/>
+                      </p:stCondLst>
+                      <p:childTnLst>
+                        <p:par>
+                          <p:cTn id="20" fill="hold">
+                            <p:stCondLst>
+                              <p:cond delay="0"/>
+                            </p:stCondLst>
+                            <p:childTnLst>
+                              <p:par>
+                                <p:cTn id="21" presetID="1" presetClass="entr" presetSubtype="0" fill="hold" grpId="0" nodeType="clickEffect">
+                                  <p:stCondLst>
+                                    <p:cond delay="0"/>
+                                  </p:stCondLst>
+                                  <p:childTnLst>
+                                    <p:set>
+                                      <p:cBhvr>
+                                        <p:cTn id="22" dur="1" fill="hold">
+                                          <p:stCondLst>
+                                            <p:cond delay="0"/>
+                                          </p:stCondLst>
+                                        </p:cTn>
+                                        <p:tgtEl>
+                                          <p:spTgt spid="15"/>
+                                        </p:tgtEl>
+                                        <p:attrNameLst>
+                                          <p:attrName>style.visibility</p:attrName>
+                                        </p:attrNameLst>
+                                      </p:cBhvr>
+                                      <p:to>
+                                        <p:strVal val="visible"/>
+                                      </p:to>
+                                    </p:set>
+                                  </p:childTnLst>
+                                </p:cTn>
+                              </p:par>
+                            </p:childTnLst>
+                          </p:cTn>
+                        </p:par>
+                      </p:childTnLst>
+                    </p:cTn>
+                  </p:par>
+                  <p:par>
+                    <p:cTn id="23" fill="hold">
+                      <p:stCondLst>
+                        <p:cond delay="indefinite"/>
+                      </p:stCondLst>
+                      <p:childTnLst>
+                        <p:par>
+                          <p:cTn id="24" fill="hold">
+                            <p:stCondLst>
+                              <p:cond delay="0"/>
+                            </p:stCondLst>
+                            <p:childTnLst>
+                              <p:par>
+                                <p:cTn id="25" presetID="1" presetClass="entr" presetSubtype="0" fill="hold" grpId="0" nodeType="clickEffect">
+                                  <p:stCondLst>
+                                    <p:cond delay="0"/>
+                                  </p:stCondLst>
+                                  <p:childTnLst>
+                                    <p:set>
+                                      <p:cBhvr>
+                                        <p:cTn id="26" dur="1" fill="hold">
+                                          <p:stCondLst>
+                                            <p:cond delay="0"/>
+                                          </p:stCondLst>
+                                        </p:cTn>
+                                        <p:tgtEl>
+                                          <p:spTgt spid="16"/>
+                                        </p:tgtEl>
+                                        <p:attrNameLst>
+                                          <p:attrName>style.visibility</p:attrName>
+                                        </p:attrNameLst>
+                                      </p:cBhvr>
+                                      <p:to>
+                                        <p:strVal val="visible"/>
+                                      </p:to>
+                                    </p:set>
+                                  </p:childTnLst>
+                                </p:cTn>
+                              </p:par>
+                            </p:childTnLst>
+                          </p:cTn>
+                        </p:par>
+                      </p:childTnLst>
+                    </p:cTn>
+                  </p:par>
+                  <p:par>
+                    <p:cTn id="27" fill="hold">
+                      <p:stCondLst>
+                        <p:cond delay="indefinite"/>
+                      </p:stCondLst>
+                      <p:childTnLst>
+                        <p:par>
+                          <p:cTn id="28" fill="hold">
+                            <p:stCondLst>
+                              <p:cond delay="0"/>
+                            </p:stCondLst>
+                            <p:childTnLst>
+                              <p:par>
+                                <p:cTn id="29" presetID="1" presetClass="entr" presetSubtype="0" fill="hold" grpId="0" nodeType="clickEffect">
+                                  <p:stCondLst>
+                                    <p:cond delay="0"/>
+                                  </p:stCondLst>
+                                  <p:childTnLst>
+                                    <p:set>
+                                      <p:cBhvr>
+                                        <p:cTn id="30" dur="1" fill="hold">
+                                          <p:stCondLst>
+                                            <p:cond delay="0"/>
+                                          </p:stCondLst>
+                                        </p:cTn>
+                                        <p:tgtEl>
+                                          <p:spTgt spid="17"/>
+                                        </p:tgtEl>
+                                        <p:attrNameLst>
+                                          <p:attrName>style.visibility</p:attrName>
+                                        </p:attrNameLst>
+                                      </p:cBhvr>
+                                      <p:to>
+                                        <p:strVal val="visible"/>
+                                      </p:to>
+                                    </p:set>
+                                  </p:childTnLst>
+                                </p:cTn>
+                              </p:par>
+                            </p:childTnLst>
+                          </p:cTn>
+                        </p:par>
+                      </p:childTnLst>
+                    </p:cTn>
+                  </p:par>
+                </p:childTnLst>
+              </p:cTn>
+              <p:prevCondLst>
+                <p:cond evt="onPrev" delay="0">
+                  <p:tgtEl>
+                    <p:sldTgt/>
+                  </p:tgtEl>
+                </p:cond>
+              </p:prevCondLst>
+              <p:nextCondLst>
+                <p:cond evt="onNext" delay="0">
+                  <p:tgtEl>
+                    <p:sldTgt/>
+                  </p:tgtEl>
+                </p:cond>
+              </p:nextCondLst>
+            </p:seq>
+          </p:childTnLst>
+        </p:cTn>
+      </p:par>
+    </p:tnLst>
+    <p:bldLst>
+      <p:bldP spid="10" grpId="0" animBg="1"/>
+      <p:bldP spid="12" grpId="0" animBg="1"/>
+      <p:bldP spid="13" grpId="0" animBg="1"/>
+      <p:bldP spid="14" grpId="0" animBg="1"/>
+      <p:bldP spid="15" grpId="0" animBg="1"/>
+      <p:bldP spid="16" grpId="0" animBg="1"/>
+      <p:bldP spid="17" grpId="0" animBg="1"/>
+    </p:bldLst>
+  </p:timing>
 </p:sld>
 </file>
 

</xml_diff>